<commit_message>
all pic present prototype
</commit_message>
<xml_diff>
--- a/Diabetes Healthy.pptx
+++ b/Diabetes Healthy.pptx
@@ -10,9 +10,10 @@
     <p:sldId id="259" r:id="rId4"/>
     <p:sldId id="260" r:id="rId5"/>
     <p:sldId id="258" r:id="rId6"/>
-    <p:sldId id="261" r:id="rId7"/>
-    <p:sldId id="262" r:id="rId8"/>
-    <p:sldId id="263" r:id="rId9"/>
+    <p:sldId id="262" r:id="rId7"/>
+    <p:sldId id="264" r:id="rId8"/>
+    <p:sldId id="261" r:id="rId9"/>
+    <p:sldId id="263" r:id="rId10"/>
   </p:sldIdLst>
   <p:sldSz cx="12192000" cy="6858000"/>
   <p:notesSz cx="6858000" cy="9144000"/>
@@ -111,6 +112,28 @@
       </a:defRPr>
     </a:lvl9pPr>
   </p:defaultTextStyle>
+  <p:extLst>
+    <p:ext uri="{521415D9-36F7-43E2-AB2F-B90AF26B5E84}">
+      <p14:sectionLst xmlns:p14="http://schemas.microsoft.com/office/powerpoint/2010/main">
+        <p14:section name="Default Section" id="{03E2D4E9-5B18-427B-B1AE-2AD7E268A467}">
+          <p14:sldIdLst>
+            <p14:sldId id="256"/>
+            <p14:sldId id="257"/>
+            <p14:sldId id="259"/>
+            <p14:sldId id="260"/>
+            <p14:sldId id="258"/>
+            <p14:sldId id="262"/>
+            <p14:sldId id="264"/>
+            <p14:sldId id="261"/>
+            <p14:sldId id="263"/>
+          </p14:sldIdLst>
+        </p14:section>
+      </p14:sectionLst>
+    </p:ext>
+    <p:ext uri="{EFAFB233-063F-42B5-8137-9DF3F51BA10A}">
+      <p15:sldGuideLst xmlns:p15="http://schemas.microsoft.com/office/powerpoint/2012/main"/>
+    </p:ext>
+  </p:extLst>
 </p:presentation>
 </file>
 
@@ -694,7 +717,7 @@
           </a:lstStyle>
           <a:p>
             <a:r>
-              <a:rPr lang="en-US" smtClean="0"/>
+              <a:rPr lang="en-US"/>
               <a:t>Click to edit Master title style</a:t>
             </a:r>
             <a:endParaRPr lang="en-US" dirty="0"/>
@@ -814,7 +837,7 @@
           </a:lstStyle>
           <a:p>
             <a:r>
-              <a:rPr lang="en-US" smtClean="0"/>
+              <a:rPr lang="en-US"/>
               <a:t>Click to edit Master subtitle style</a:t>
             </a:r>
             <a:endParaRPr lang="en-US" dirty="0"/>
@@ -839,7 +862,7 @@
             <a:fld id="{B61BEF0D-F0BB-DE4B-95CE-6DB70DBA9567}" type="datetimeFigureOut">
               <a:rPr lang="en-US" dirty="0"/>
               <a:pPr/>
-              <a:t>1/27/2017</a:t>
+              <a:t>1/30/2017</a:t>
             </a:fld>
             <a:endParaRPr lang="en-US" dirty="0"/>
           </a:p>
@@ -940,7 +963,7 @@
           </a:lstStyle>
           <a:p>
             <a:r>
-              <a:rPr lang="en-US" smtClean="0"/>
+              <a:rPr lang="en-US"/>
               <a:t>Click to edit Master title style</a:t>
             </a:r>
             <a:endParaRPr lang="en-US" dirty="0"/>
@@ -1063,7 +1086,7 @@
           <a:p>
             <a:pPr lvl="0"/>
             <a:r>
-              <a:rPr lang="en-US" smtClean="0"/>
+              <a:rPr lang="en-US"/>
               <a:t>Edit Master text styles</a:t>
             </a:r>
           </a:p>
@@ -1087,7 +1110,7 @@
             <a:fld id="{B61BEF0D-F0BB-DE4B-95CE-6DB70DBA9567}" type="datetimeFigureOut">
               <a:rPr lang="en-US" dirty="0"/>
               <a:pPr/>
-              <a:t>1/27/2017</a:t>
+              <a:t>1/30/2017</a:t>
             </a:fld>
             <a:endParaRPr lang="en-US" dirty="0"/>
           </a:p>
@@ -1188,7 +1211,7 @@
           </a:lstStyle>
           <a:p>
             <a:r>
-              <a:rPr lang="en-US" smtClean="0"/>
+              <a:rPr lang="en-US"/>
               <a:t>Click to edit Master title style</a:t>
             </a:r>
             <a:endParaRPr lang="en-US" dirty="0"/>
@@ -1252,7 +1275,7 @@
           <a:p>
             <a:pPr lvl="0"/>
             <a:r>
-              <a:rPr lang="en-US" smtClean="0"/>
+              <a:rPr lang="en-US"/>
               <a:t>Edit Master text styles</a:t>
             </a:r>
           </a:p>
@@ -1374,7 +1397,7 @@
           <a:p>
             <a:pPr lvl="0"/>
             <a:r>
-              <a:rPr lang="en-US" smtClean="0"/>
+              <a:rPr lang="en-US"/>
               <a:t>Edit Master text styles</a:t>
             </a:r>
           </a:p>
@@ -1398,7 +1421,7 @@
             <a:fld id="{B61BEF0D-F0BB-DE4B-95CE-6DB70DBA9567}" type="datetimeFigureOut">
               <a:rPr lang="en-US" dirty="0"/>
               <a:pPr/>
-              <a:t>1/27/2017</a:t>
+              <a:t>1/30/2017</a:t>
             </a:fld>
             <a:endParaRPr lang="en-US" dirty="0"/>
           </a:p>
@@ -1575,7 +1598,7 @@
           </a:lstStyle>
           <a:p>
             <a:r>
-              <a:rPr lang="en-US" smtClean="0"/>
+              <a:rPr lang="en-US"/>
               <a:t>Click to edit Master title style</a:t>
             </a:r>
             <a:endParaRPr lang="en-US" dirty="0"/>
@@ -1698,7 +1721,7 @@
           <a:p>
             <a:pPr lvl="0"/>
             <a:r>
-              <a:rPr lang="en-US" smtClean="0"/>
+              <a:rPr lang="en-US"/>
               <a:t>Edit Master text styles</a:t>
             </a:r>
           </a:p>
@@ -1722,7 +1745,7 @@
             <a:fld id="{B61BEF0D-F0BB-DE4B-95CE-6DB70DBA9567}" type="datetimeFigureOut">
               <a:rPr lang="en-US" dirty="0"/>
               <a:pPr/>
-              <a:t>1/27/2017</a:t>
+              <a:t>1/30/2017</a:t>
             </a:fld>
             <a:endParaRPr lang="en-US" dirty="0"/>
           </a:p>
@@ -1823,7 +1846,7 @@
           </a:lstStyle>
           <a:p>
             <a:r>
-              <a:rPr lang="en-US" smtClean="0"/>
+              <a:rPr lang="en-US"/>
               <a:t>Click to edit Master title style</a:t>
             </a:r>
             <a:endParaRPr lang="en-US" dirty="0"/>
@@ -1887,7 +1910,7 @@
           <a:p>
             <a:pPr lvl="0"/>
             <a:r>
-              <a:rPr lang="en-US" smtClean="0"/>
+              <a:rPr lang="en-US"/>
               <a:t>Edit Master text styles</a:t>
             </a:r>
           </a:p>
@@ -2009,7 +2032,7 @@
           <a:p>
             <a:pPr lvl="0"/>
             <a:r>
-              <a:rPr lang="en-US" smtClean="0"/>
+              <a:rPr lang="en-US"/>
               <a:t>Edit Master text styles</a:t>
             </a:r>
           </a:p>
@@ -2033,7 +2056,7 @@
             <a:fld id="{B61BEF0D-F0BB-DE4B-95CE-6DB70DBA9567}" type="datetimeFigureOut">
               <a:rPr lang="en-US" dirty="0"/>
               <a:pPr/>
-              <a:t>1/27/2017</a:t>
+              <a:t>1/30/2017</a:t>
             </a:fld>
             <a:endParaRPr lang="en-US" dirty="0"/>
           </a:p>
@@ -2210,7 +2233,7 @@
           </a:lstStyle>
           <a:p>
             <a:r>
-              <a:rPr lang="en-US" smtClean="0"/>
+              <a:rPr lang="en-US"/>
               <a:t>Click to edit Master title style</a:t>
             </a:r>
             <a:endParaRPr lang="en-US" dirty="0"/>
@@ -2271,7 +2294,7 @@
           <a:p>
             <a:pPr lvl="0"/>
             <a:r>
-              <a:rPr lang="en-US" smtClean="0"/>
+              <a:rPr lang="en-US"/>
               <a:t>Edit Master text styles</a:t>
             </a:r>
           </a:p>
@@ -2393,7 +2416,7 @@
           <a:p>
             <a:pPr lvl="0"/>
             <a:r>
-              <a:rPr lang="en-US" smtClean="0"/>
+              <a:rPr lang="en-US"/>
               <a:t>Edit Master text styles</a:t>
             </a:r>
           </a:p>
@@ -2417,7 +2440,7 @@
             <a:fld id="{B61BEF0D-F0BB-DE4B-95CE-6DB70DBA9567}" type="datetimeFigureOut">
               <a:rPr lang="en-US" dirty="0"/>
               <a:pPr/>
-              <a:t>1/27/2017</a:t>
+              <a:t>1/30/2017</a:t>
             </a:fld>
             <a:endParaRPr lang="en-US" dirty="0"/>
           </a:p>
@@ -2507,7 +2530,7 @@
           <a:lstStyle/>
           <a:p>
             <a:r>
-              <a:rPr lang="en-US" smtClean="0"/>
+              <a:rPr lang="en-US"/>
               <a:t>Click to edit Master title style</a:t>
             </a:r>
             <a:endParaRPr lang="en-US" dirty="0"/>
@@ -2531,35 +2554,35 @@
           <a:p>
             <a:pPr lvl="0"/>
             <a:r>
-              <a:rPr lang="en-US" smtClean="0"/>
+              <a:rPr lang="en-US"/>
               <a:t>Edit Master text styles</a:t>
             </a:r>
           </a:p>
           <a:p>
             <a:pPr lvl="1"/>
             <a:r>
-              <a:rPr lang="en-US" smtClean="0"/>
+              <a:rPr lang="en-US"/>
               <a:t>Second level</a:t>
             </a:r>
           </a:p>
           <a:p>
             <a:pPr lvl="2"/>
             <a:r>
-              <a:rPr lang="en-US" smtClean="0"/>
+              <a:rPr lang="en-US"/>
               <a:t>Third level</a:t>
             </a:r>
           </a:p>
           <a:p>
             <a:pPr lvl="3"/>
             <a:r>
-              <a:rPr lang="en-US" smtClean="0"/>
+              <a:rPr lang="en-US"/>
               <a:t>Fourth level</a:t>
             </a:r>
           </a:p>
           <a:p>
             <a:pPr lvl="4"/>
             <a:r>
-              <a:rPr lang="en-US" smtClean="0"/>
+              <a:rPr lang="en-US"/>
               <a:t>Fifth level</a:t>
             </a:r>
             <a:endParaRPr lang="en-US" dirty="0"/>
@@ -2583,7 +2606,7 @@
           <a:p>
             <a:fld id="{55C6B4A9-1611-4792-9094-5F34BCA07E0B}" type="datetimeFigureOut">
               <a:rPr lang="en-US" dirty="0"/>
-              <a:t>1/27/2017</a:t>
+              <a:t>1/30/2017</a:t>
             </a:fld>
             <a:endParaRPr lang="en-US" dirty="0"/>
           </a:p>
@@ -2677,7 +2700,7 @@
           <a:lstStyle/>
           <a:p>
             <a:r>
-              <a:rPr lang="en-US" smtClean="0"/>
+              <a:rPr lang="en-US"/>
               <a:t>Click to edit Master title style</a:t>
             </a:r>
             <a:endParaRPr lang="en-US" dirty="0"/>
@@ -2706,35 +2729,35 @@
           <a:p>
             <a:pPr lvl="0"/>
             <a:r>
-              <a:rPr lang="en-US" smtClean="0"/>
+              <a:rPr lang="en-US"/>
               <a:t>Edit Master text styles</a:t>
             </a:r>
           </a:p>
           <a:p>
             <a:pPr lvl="1"/>
             <a:r>
-              <a:rPr lang="en-US" smtClean="0"/>
+              <a:rPr lang="en-US"/>
               <a:t>Second level</a:t>
             </a:r>
           </a:p>
           <a:p>
             <a:pPr lvl="2"/>
             <a:r>
-              <a:rPr lang="en-US" smtClean="0"/>
+              <a:rPr lang="en-US"/>
               <a:t>Third level</a:t>
             </a:r>
           </a:p>
           <a:p>
             <a:pPr lvl="3"/>
             <a:r>
-              <a:rPr lang="en-US" smtClean="0"/>
+              <a:rPr lang="en-US"/>
               <a:t>Fourth level</a:t>
             </a:r>
           </a:p>
           <a:p>
             <a:pPr lvl="4"/>
             <a:r>
-              <a:rPr lang="en-US" smtClean="0"/>
+              <a:rPr lang="en-US"/>
               <a:t>Fifth level</a:t>
             </a:r>
             <a:endParaRPr lang="en-US" dirty="0"/>
@@ -2759,7 +2782,7 @@
             <a:fld id="{B61BEF0D-F0BB-DE4B-95CE-6DB70DBA9567}" type="datetimeFigureOut">
               <a:rPr lang="en-US" dirty="0"/>
               <a:pPr/>
-              <a:t>1/27/2017</a:t>
+              <a:t>1/30/2017</a:t>
             </a:fld>
             <a:endParaRPr lang="en-US" dirty="0"/>
           </a:p>
@@ -2855,7 +2878,7 @@
           </a:lstStyle>
           <a:p>
             <a:r>
-              <a:rPr lang="en-US" smtClean="0"/>
+              <a:rPr lang="en-US"/>
               <a:t>Click to edit Master title style</a:t>
             </a:r>
             <a:endParaRPr lang="en-US" dirty="0"/>
@@ -2879,35 +2902,35 @@
           <a:p>
             <a:pPr lvl="0"/>
             <a:r>
-              <a:rPr lang="en-US" smtClean="0"/>
+              <a:rPr lang="en-US"/>
               <a:t>Edit Master text styles</a:t>
             </a:r>
           </a:p>
           <a:p>
             <a:pPr lvl="1"/>
             <a:r>
-              <a:rPr lang="en-US" smtClean="0"/>
+              <a:rPr lang="en-US"/>
               <a:t>Second level</a:t>
             </a:r>
           </a:p>
           <a:p>
             <a:pPr lvl="2"/>
             <a:r>
-              <a:rPr lang="en-US" smtClean="0"/>
+              <a:rPr lang="en-US"/>
               <a:t>Third level</a:t>
             </a:r>
           </a:p>
           <a:p>
             <a:pPr lvl="3"/>
             <a:r>
-              <a:rPr lang="en-US" smtClean="0"/>
+              <a:rPr lang="en-US"/>
               <a:t>Fourth level</a:t>
             </a:r>
           </a:p>
           <a:p>
             <a:pPr lvl="4"/>
             <a:r>
-              <a:rPr lang="en-US" smtClean="0"/>
+              <a:rPr lang="en-US"/>
               <a:t>Fifth level</a:t>
             </a:r>
             <a:endParaRPr lang="en-US" dirty="0"/>
@@ -2932,7 +2955,7 @@
             <a:fld id="{B61BEF0D-F0BB-DE4B-95CE-6DB70DBA9567}" type="datetimeFigureOut">
               <a:rPr lang="en-US" dirty="0"/>
               <a:pPr/>
-              <a:t>1/27/2017</a:t>
+              <a:t>1/30/2017</a:t>
             </a:fld>
             <a:endParaRPr lang="en-US" dirty="0"/>
           </a:p>
@@ -3031,7 +3054,7 @@
           </a:lstStyle>
           <a:p>
             <a:r>
-              <a:rPr lang="en-US" smtClean="0"/>
+              <a:rPr lang="en-US"/>
               <a:t>Click to edit Master title style</a:t>
             </a:r>
             <a:endParaRPr lang="en-US" dirty="0"/>
@@ -3152,7 +3175,7 @@
           <a:p>
             <a:pPr lvl="0"/>
             <a:r>
-              <a:rPr lang="en-US" smtClean="0"/>
+              <a:rPr lang="en-US"/>
               <a:t>Edit Master text styles</a:t>
             </a:r>
           </a:p>
@@ -3176,7 +3199,7 @@
             <a:fld id="{B61BEF0D-F0BB-DE4B-95CE-6DB70DBA9567}" type="datetimeFigureOut">
               <a:rPr lang="en-US" dirty="0"/>
               <a:pPr/>
-              <a:t>1/27/2017</a:t>
+              <a:t>1/30/2017</a:t>
             </a:fld>
             <a:endParaRPr lang="en-US" dirty="0"/>
           </a:p>
@@ -3266,7 +3289,7 @@
           <a:lstStyle/>
           <a:p>
             <a:r>
-              <a:rPr lang="en-US" smtClean="0"/>
+              <a:rPr lang="en-US"/>
               <a:t>Click to edit Master title style</a:t>
             </a:r>
             <a:endParaRPr lang="en-US" dirty="0"/>
@@ -3295,35 +3318,35 @@
           <a:p>
             <a:pPr lvl="0"/>
             <a:r>
-              <a:rPr lang="en-US" smtClean="0"/>
+              <a:rPr lang="en-US"/>
               <a:t>Edit Master text styles</a:t>
             </a:r>
           </a:p>
           <a:p>
             <a:pPr lvl="1"/>
             <a:r>
-              <a:rPr lang="en-US" smtClean="0"/>
+              <a:rPr lang="en-US"/>
               <a:t>Second level</a:t>
             </a:r>
           </a:p>
           <a:p>
             <a:pPr lvl="2"/>
             <a:r>
-              <a:rPr lang="en-US" smtClean="0"/>
+              <a:rPr lang="en-US"/>
               <a:t>Third level</a:t>
             </a:r>
           </a:p>
           <a:p>
             <a:pPr lvl="3"/>
             <a:r>
-              <a:rPr lang="en-US" smtClean="0"/>
+              <a:rPr lang="en-US"/>
               <a:t>Fourth level</a:t>
             </a:r>
           </a:p>
           <a:p>
             <a:pPr lvl="4"/>
             <a:r>
-              <a:rPr lang="en-US" smtClean="0"/>
+              <a:rPr lang="en-US"/>
               <a:t>Fifth level</a:t>
             </a:r>
             <a:endParaRPr lang="en-US" dirty="0"/>
@@ -3352,35 +3375,35 @@
           <a:p>
             <a:pPr lvl="0"/>
             <a:r>
-              <a:rPr lang="en-US" smtClean="0"/>
+              <a:rPr lang="en-US"/>
               <a:t>Edit Master text styles</a:t>
             </a:r>
           </a:p>
           <a:p>
             <a:pPr lvl="1"/>
             <a:r>
-              <a:rPr lang="en-US" smtClean="0"/>
+              <a:rPr lang="en-US"/>
               <a:t>Second level</a:t>
             </a:r>
           </a:p>
           <a:p>
             <a:pPr lvl="2"/>
             <a:r>
-              <a:rPr lang="en-US" smtClean="0"/>
+              <a:rPr lang="en-US"/>
               <a:t>Third level</a:t>
             </a:r>
           </a:p>
           <a:p>
             <a:pPr lvl="3"/>
             <a:r>
-              <a:rPr lang="en-US" smtClean="0"/>
+              <a:rPr lang="en-US"/>
               <a:t>Fourth level</a:t>
             </a:r>
           </a:p>
           <a:p>
             <a:pPr lvl="4"/>
             <a:r>
-              <a:rPr lang="en-US" smtClean="0"/>
+              <a:rPr lang="en-US"/>
               <a:t>Fifth level</a:t>
             </a:r>
             <a:endParaRPr lang="en-US" dirty="0"/>
@@ -3404,7 +3427,7 @@
           <a:p>
             <a:fld id="{EB712588-04B1-427B-82EE-E8DB90309F08}" type="datetimeFigureOut">
               <a:rPr lang="en-US" dirty="0"/>
-              <a:t>1/27/2017</a:t>
+              <a:t>1/30/2017</a:t>
             </a:fld>
             <a:endParaRPr lang="en-US" dirty="0"/>
           </a:p>
@@ -3497,7 +3520,7 @@
           </a:lstStyle>
           <a:p>
             <a:r>
-              <a:rPr lang="en-US" smtClean="0"/>
+              <a:rPr lang="en-US"/>
               <a:t>Click to edit Master title style</a:t>
             </a:r>
             <a:endParaRPr lang="en-US" dirty="0"/>
@@ -3565,7 +3588,7 @@
           <a:p>
             <a:pPr lvl="0"/>
             <a:r>
-              <a:rPr lang="en-US" smtClean="0"/>
+              <a:rPr lang="en-US"/>
               <a:t>Edit Master text styles</a:t>
             </a:r>
           </a:p>
@@ -3595,35 +3618,35 @@
           <a:p>
             <a:pPr lvl="0"/>
             <a:r>
-              <a:rPr lang="en-US" smtClean="0"/>
+              <a:rPr lang="en-US"/>
               <a:t>Edit Master text styles</a:t>
             </a:r>
           </a:p>
           <a:p>
             <a:pPr lvl="1"/>
             <a:r>
-              <a:rPr lang="en-US" smtClean="0"/>
+              <a:rPr lang="en-US"/>
               <a:t>Second level</a:t>
             </a:r>
           </a:p>
           <a:p>
             <a:pPr lvl="2"/>
             <a:r>
-              <a:rPr lang="en-US" smtClean="0"/>
+              <a:rPr lang="en-US"/>
               <a:t>Third level</a:t>
             </a:r>
           </a:p>
           <a:p>
             <a:pPr lvl="3"/>
             <a:r>
-              <a:rPr lang="en-US" smtClean="0"/>
+              <a:rPr lang="en-US"/>
               <a:t>Fourth level</a:t>
             </a:r>
           </a:p>
           <a:p>
             <a:pPr lvl="4"/>
             <a:r>
-              <a:rPr lang="en-US" smtClean="0"/>
+              <a:rPr lang="en-US"/>
               <a:t>Fifth level</a:t>
             </a:r>
             <a:endParaRPr lang="en-US" dirty="0"/>
@@ -3691,7 +3714,7 @@
           <a:p>
             <a:pPr lvl="0"/>
             <a:r>
-              <a:rPr lang="en-US" smtClean="0"/>
+              <a:rPr lang="en-US"/>
               <a:t>Edit Master text styles</a:t>
             </a:r>
           </a:p>
@@ -3721,35 +3744,35 @@
           <a:p>
             <a:pPr lvl="0"/>
             <a:r>
-              <a:rPr lang="en-US" smtClean="0"/>
+              <a:rPr lang="en-US"/>
               <a:t>Edit Master text styles</a:t>
             </a:r>
           </a:p>
           <a:p>
             <a:pPr lvl="1"/>
             <a:r>
-              <a:rPr lang="en-US" smtClean="0"/>
+              <a:rPr lang="en-US"/>
               <a:t>Second level</a:t>
             </a:r>
           </a:p>
           <a:p>
             <a:pPr lvl="2"/>
             <a:r>
-              <a:rPr lang="en-US" smtClean="0"/>
+              <a:rPr lang="en-US"/>
               <a:t>Third level</a:t>
             </a:r>
           </a:p>
           <a:p>
             <a:pPr lvl="3"/>
             <a:r>
-              <a:rPr lang="en-US" smtClean="0"/>
+              <a:rPr lang="en-US"/>
               <a:t>Fourth level</a:t>
             </a:r>
           </a:p>
           <a:p>
             <a:pPr lvl="4"/>
             <a:r>
-              <a:rPr lang="en-US" smtClean="0"/>
+              <a:rPr lang="en-US"/>
               <a:t>Fifth level</a:t>
             </a:r>
             <a:endParaRPr lang="en-US" dirty="0"/>
@@ -3774,7 +3797,7 @@
             <a:fld id="{B61BEF0D-F0BB-DE4B-95CE-6DB70DBA9567}" type="datetimeFigureOut">
               <a:rPr lang="en-US" dirty="0"/>
               <a:pPr/>
-              <a:t>1/27/2017</a:t>
+              <a:t>1/30/2017</a:t>
             </a:fld>
             <a:endParaRPr lang="en-US" dirty="0"/>
           </a:p>
@@ -3869,7 +3892,7 @@
           <a:lstStyle/>
           <a:p>
             <a:r>
-              <a:rPr lang="en-US" smtClean="0"/>
+              <a:rPr lang="en-US"/>
               <a:t>Click to edit Master title style</a:t>
             </a:r>
             <a:endParaRPr lang="en-US" dirty="0"/>
@@ -3894,7 +3917,7 @@
             <a:fld id="{B61BEF0D-F0BB-DE4B-95CE-6DB70DBA9567}" type="datetimeFigureOut">
               <a:rPr lang="en-US" dirty="0"/>
               <a:pPr/>
-              <a:t>1/27/2017</a:t>
+              <a:t>1/30/2017</a:t>
             </a:fld>
             <a:endParaRPr lang="en-US" dirty="0"/>
           </a:p>
@@ -3986,7 +4009,7 @@
             <a:fld id="{B61BEF0D-F0BB-DE4B-95CE-6DB70DBA9567}" type="datetimeFigureOut">
               <a:rPr lang="en-US" dirty="0"/>
               <a:pPr/>
-              <a:t>1/27/2017</a:t>
+              <a:t>1/30/2017</a:t>
             </a:fld>
             <a:endParaRPr lang="en-US" dirty="0"/>
           </a:p>
@@ -4087,7 +4110,7 @@
           </a:lstStyle>
           <a:p>
             <a:r>
-              <a:rPr lang="en-US" smtClean="0"/>
+              <a:rPr lang="en-US"/>
               <a:t>Click to edit Master title style</a:t>
             </a:r>
             <a:endParaRPr lang="en-US" dirty="0"/>
@@ -4118,35 +4141,35 @@
           <a:p>
             <a:pPr lvl="0"/>
             <a:r>
-              <a:rPr lang="en-US" smtClean="0"/>
+              <a:rPr lang="en-US"/>
               <a:t>Edit Master text styles</a:t>
             </a:r>
           </a:p>
           <a:p>
             <a:pPr lvl="1"/>
             <a:r>
-              <a:rPr lang="en-US" smtClean="0"/>
+              <a:rPr lang="en-US"/>
               <a:t>Second level</a:t>
             </a:r>
           </a:p>
           <a:p>
             <a:pPr lvl="2"/>
             <a:r>
-              <a:rPr lang="en-US" smtClean="0"/>
+              <a:rPr lang="en-US"/>
               <a:t>Third level</a:t>
             </a:r>
           </a:p>
           <a:p>
             <a:pPr lvl="3"/>
             <a:r>
-              <a:rPr lang="en-US" smtClean="0"/>
+              <a:rPr lang="en-US"/>
               <a:t>Fourth level</a:t>
             </a:r>
           </a:p>
           <a:p>
             <a:pPr lvl="4"/>
             <a:r>
-              <a:rPr lang="en-US" smtClean="0"/>
+              <a:rPr lang="en-US"/>
               <a:t>Fifth level</a:t>
             </a:r>
             <a:endParaRPr lang="en-US" dirty="0"/>
@@ -4214,7 +4237,7 @@
           <a:p>
             <a:pPr lvl="0"/>
             <a:r>
-              <a:rPr lang="en-US" smtClean="0"/>
+              <a:rPr lang="en-US"/>
               <a:t>Edit Master text styles</a:t>
             </a:r>
           </a:p>
@@ -4237,7 +4260,7 @@
           <a:p>
             <a:fld id="{42A54C80-263E-416B-A8E0-580EDEADCBDC}" type="datetimeFigureOut">
               <a:rPr lang="en-US" dirty="0"/>
-              <a:t>1/27/2017</a:t>
+              <a:t>1/30/2017</a:t>
             </a:fld>
             <a:endParaRPr lang="en-US" dirty="0"/>
           </a:p>
@@ -4337,7 +4360,7 @@
           </a:lstStyle>
           <a:p>
             <a:r>
-              <a:rPr lang="en-US" smtClean="0"/>
+              <a:rPr lang="en-US"/>
               <a:t>Click to edit Master title style</a:t>
             </a:r>
             <a:endParaRPr lang="en-US" dirty="0"/>
@@ -4404,7 +4427,7 @@
           </a:lstStyle>
           <a:p>
             <a:r>
-              <a:rPr lang="en-US" smtClean="0"/>
+              <a:rPr lang="en-US"/>
               <a:t>Click icon to add picture</a:t>
             </a:r>
             <a:endParaRPr lang="en-US" dirty="0"/>
@@ -4472,7 +4495,7 @@
           <a:p>
             <a:pPr lvl="0"/>
             <a:r>
-              <a:rPr lang="en-US" smtClean="0"/>
+              <a:rPr lang="en-US"/>
               <a:t>Edit Master text styles</a:t>
             </a:r>
           </a:p>
@@ -4496,7 +4519,7 @@
             <a:fld id="{B61BEF0D-F0BB-DE4B-95CE-6DB70DBA9567}" type="datetimeFigureOut">
               <a:rPr lang="en-US" dirty="0"/>
               <a:pPr/>
-              <a:t>1/27/2017</a:t>
+              <a:t>1/30/2017</a:t>
             </a:fld>
             <a:endParaRPr lang="en-US" dirty="0"/>
           </a:p>
@@ -5133,7 +5156,7 @@
           <a:lstStyle/>
           <a:p>
             <a:r>
-              <a:rPr lang="en-US" smtClean="0"/>
+              <a:rPr lang="en-US"/>
               <a:t>Click to edit Master title style</a:t>
             </a:r>
             <a:endParaRPr lang="en-US" dirty="0"/>
@@ -5167,35 +5190,35 @@
           <a:p>
             <a:pPr lvl="0"/>
             <a:r>
-              <a:rPr lang="en-US" smtClean="0"/>
+              <a:rPr lang="en-US"/>
               <a:t>Edit Master text styles</a:t>
             </a:r>
           </a:p>
           <a:p>
             <a:pPr lvl="1"/>
             <a:r>
-              <a:rPr lang="en-US" smtClean="0"/>
+              <a:rPr lang="en-US"/>
               <a:t>Second level</a:t>
             </a:r>
           </a:p>
           <a:p>
             <a:pPr lvl="2"/>
             <a:r>
-              <a:rPr lang="en-US" smtClean="0"/>
+              <a:rPr lang="en-US"/>
               <a:t>Third level</a:t>
             </a:r>
           </a:p>
           <a:p>
             <a:pPr lvl="3"/>
             <a:r>
-              <a:rPr lang="en-US" smtClean="0"/>
+              <a:rPr lang="en-US"/>
               <a:t>Fourth level</a:t>
             </a:r>
           </a:p>
           <a:p>
             <a:pPr lvl="4"/>
             <a:r>
-              <a:rPr lang="en-US" smtClean="0"/>
+              <a:rPr lang="en-US"/>
               <a:t>Fifth level</a:t>
             </a:r>
             <a:endParaRPr lang="en-US" dirty="0"/>
@@ -5238,7 +5261,7 @@
             <a:fld id="{B61BEF0D-F0BB-DE4B-95CE-6DB70DBA9567}" type="datetimeFigureOut">
               <a:rPr lang="en-US" dirty="0"/>
               <a:pPr/>
-              <a:t>1/27/2017</a:t>
+              <a:t>1/30/2017</a:t>
             </a:fld>
             <a:endParaRPr lang="en-US" dirty="0"/>
           </a:p>
@@ -5943,10 +5966,6 @@
               <a:rPr lang="th-TH" sz="4800" dirty="0"/>
               <a:t>ที่มาและความสำคัญของปัญหา</a:t>
             </a:r>
-            <a:r>
-              <a:rPr lang="en-US" sz="4800" dirty="0"/>
-              <a:t/>
-            </a:r>
             <a:br>
               <a:rPr lang="en-US" sz="4800" dirty="0"/>
             </a:br>
@@ -5978,7 +5997,7 @@
         </p:blipFill>
         <p:spPr>
           <a:xfrm>
-            <a:off x="677334" y="2074091"/>
+            <a:off x="2411584" y="2275797"/>
             <a:ext cx="5128168" cy="3111141"/>
           </a:xfrm>
         </p:spPr>
@@ -6056,7 +6075,7 @@
         </p:blipFill>
         <p:spPr>
           <a:xfrm>
-            <a:off x="677334" y="1794948"/>
+            <a:off x="2473164" y="1930400"/>
             <a:ext cx="5005007" cy="3339548"/>
           </a:xfrm>
         </p:spPr>
@@ -6134,7 +6153,7 @@
         </p:blipFill>
         <p:spPr>
           <a:xfrm>
-            <a:off x="771955" y="2322286"/>
+            <a:off x="2507411" y="2429862"/>
             <a:ext cx="4936514" cy="3131244"/>
           </a:xfrm>
         </p:spPr>
@@ -6182,7 +6201,7 @@
         <p:spPr/>
         <p:txBody>
           <a:bodyPr>
-            <a:normAutofit/>
+            <a:normAutofit fontScale="90000"/>
           </a:bodyPr>
           <a:lstStyle/>
           <a:p>
@@ -6194,7 +6213,6 @@
               <a:rPr lang="th-TH" sz="5400" dirty="0"/>
               <a:t>เทคโนโลยีที่ใช้ ภาษาที่ใช้ในการพัฒนา</a:t>
             </a:r>
-            <a:endParaRPr lang="th-TH" sz="5400" dirty="0"/>
           </a:p>
         </p:txBody>
       </p:sp>
@@ -6226,15 +6244,7 @@
             </a:r>
             <a:r>
               <a:rPr lang="th-TH" sz="2200" dirty="0"/>
-              <a:t>เราจะทำ</a:t>
-            </a:r>
-            <a:r>
-              <a:rPr lang="th-TH" sz="2200" dirty="0" smtClean="0"/>
-              <a:t>การใช้พัฒนา</a:t>
-            </a:r>
-            <a:r>
-              <a:rPr lang="th-TH" sz="2200" dirty="0"/>
-              <a:t>เป็น </a:t>
+              <a:t>เราจะทำการใช้พัฒนาเป็น </a:t>
             </a:r>
             <a:r>
               <a:rPr lang="en-US" sz="2200" dirty="0"/>
@@ -6391,35 +6401,58 @@
           <a:p>
             <a:r>
               <a:rPr lang="en-US" dirty="0"/>
-              <a:t>- Use Case Diagrams</a:t>
+              <a:t>- </a:t>
+            </a:r>
+            <a:r>
+              <a:rPr lang="th-TH" dirty="0"/>
+              <a:t>การแบ่งหน้าที่ความรับผิดชอบของสมาชิกแต่ละคนภายในทีม</a:t>
+            </a:r>
+          </a:p>
+        </p:txBody>
+      </p:sp>
+      <p:sp>
+        <p:nvSpPr>
+          <p:cNvPr id="3" name="Content Placeholder 2"/>
+          <p:cNvSpPr>
+            <a:spLocks noGrp="1"/>
+          </p:cNvSpPr>
+          <p:nvPr>
+            <p:ph idx="1"/>
+          </p:nvPr>
+        </p:nvSpPr>
+        <p:spPr/>
+        <p:txBody>
+          <a:bodyPr/>
+          <a:lstStyle/>
+          <a:p>
+            <a:r>
+              <a:rPr lang="th-TH" dirty="0"/>
+              <a:t>ในกลุ่มของผมจะใช้การทำงานร่วมกันโดยใช้รูปแบบในการพัฒนาแบบ </a:t>
+            </a:r>
+            <a:r>
+              <a:rPr lang="en-US" dirty="0"/>
+              <a:t>Agile </a:t>
+            </a:r>
+            <a:r>
+              <a:rPr lang="th-TH" dirty="0"/>
+              <a:t>ในแบบ </a:t>
+            </a:r>
+            <a:r>
+              <a:rPr lang="en-US" dirty="0"/>
+              <a:t>Scrum </a:t>
+            </a:r>
+            <a:r>
+              <a:rPr lang="th-TH" dirty="0"/>
+              <a:t>เป็นการทำงานแบบช่วยกันทำในแต่ละฟังก์ชั่นเพื่อให้การทำงานในแต่ละฟังก์ชันเสร็จสิ้นอย่างรวดเร็ว และทำให้เห็นถึงข้อเสียของแต่ละรอบการทำงานเพื่อให้พัฒนาการทำงานในรอบการทำงานถัดไปมีประสิทธิภาพดีขึ้น</a:t>
             </a:r>
             <a:endParaRPr lang="th-TH" dirty="0"/>
-          </a:p>
-        </p:txBody>
-      </p:sp>
-      <p:sp>
-        <p:nvSpPr>
-          <p:cNvPr id="3" name="Content Placeholder 2"/>
-          <p:cNvSpPr>
-            <a:spLocks noGrp="1"/>
-          </p:cNvSpPr>
-          <p:nvPr>
-            <p:ph idx="1"/>
-          </p:nvPr>
-        </p:nvSpPr>
-        <p:spPr/>
-        <p:txBody>
-          <a:bodyPr/>
-          <a:lstStyle/>
-          <a:p>
-            <a:endParaRPr lang="th-TH"/>
           </a:p>
         </p:txBody>
       </p:sp>
     </p:spTree>
     <p:extLst>
       <p:ext uri="{BB962C8B-B14F-4D97-AF65-F5344CB8AC3E}">
-        <p14:creationId xmlns:p14="http://schemas.microsoft.com/office/powerpoint/2010/main" val="295132545"/>
+        <p14:creationId xmlns:p14="http://schemas.microsoft.com/office/powerpoint/2010/main" val="750903798"/>
       </p:ext>
     </p:extLst>
   </p:cSld>
@@ -6461,41 +6494,57 @@
           <a:bodyPr/>
           <a:lstStyle/>
           <a:p>
-            <a:r>
-              <a:rPr lang="en-US" dirty="0"/>
-              <a:t>- </a:t>
-            </a:r>
-            <a:r>
-              <a:rPr lang="th-TH" dirty="0"/>
-              <a:t>การแบ่งหน้าที่ความรับผิดชอบของสมาชิกแต่ละคนภายในทีม</a:t>
-            </a:r>
-            <a:endParaRPr lang="th-TH" dirty="0"/>
-          </a:p>
-        </p:txBody>
-      </p:sp>
-      <p:sp>
-        <p:nvSpPr>
-          <p:cNvPr id="3" name="Content Placeholder 2"/>
-          <p:cNvSpPr>
-            <a:spLocks noGrp="1"/>
-          </p:cNvSpPr>
+            <a:endParaRPr lang="en-US"/>
+          </a:p>
+        </p:txBody>
+      </p:sp>
+      <p:pic>
+        <p:nvPicPr>
+          <p:cNvPr id="1026" name="Picture 2" descr="ผลการค้นหารูปภาพสำหรับ agile scrum"/>
+          <p:cNvPicPr>
+            <a:picLocks noGrp="1" noChangeAspect="1" noChangeArrowheads="1"/>
+          </p:cNvPicPr>
           <p:nvPr>
             <p:ph idx="1"/>
           </p:nvPr>
-        </p:nvSpPr>
-        <p:spPr/>
-        <p:txBody>
-          <a:bodyPr/>
-          <a:lstStyle/>
-          <a:p>
-            <a:endParaRPr lang="th-TH"/>
-          </a:p>
-        </p:txBody>
-      </p:sp>
+        </p:nvPicPr>
+        <p:blipFill>
+          <a:blip r:embed="rId2">
+            <a:extLst>
+              <a:ext uri="{28A0092B-C50C-407E-A947-70E740481C1C}">
+                <a14:useLocalDpi xmlns:a14="http://schemas.microsoft.com/office/drawing/2010/main" val="0"/>
+              </a:ext>
+            </a:extLst>
+          </a:blip>
+          <a:srcRect/>
+          <a:stretch>
+            <a:fillRect/>
+          </a:stretch>
+        </p:blipFill>
+        <p:spPr bwMode="auto">
+          <a:xfrm>
+            <a:off x="1637900" y="1930400"/>
+            <a:ext cx="6675536" cy="3881437"/>
+          </a:xfrm>
+          <a:prstGeom prst="rect">
+            <a:avLst/>
+          </a:prstGeom>
+          <a:noFill/>
+          <a:extLst>
+            <a:ext uri="{909E8E84-426E-40DD-AFC4-6F175D3DCCD1}">
+              <a14:hiddenFill xmlns:a14="http://schemas.microsoft.com/office/drawing/2010/main">
+                <a:solidFill>
+                  <a:srgbClr val="FFFFFF"/>
+                </a:solidFill>
+              </a14:hiddenFill>
+            </a:ext>
+          </a:extLst>
+        </p:spPr>
+      </p:pic>
     </p:spTree>
     <p:extLst>
       <p:ext uri="{BB962C8B-B14F-4D97-AF65-F5344CB8AC3E}">
-        <p14:creationId xmlns:p14="http://schemas.microsoft.com/office/powerpoint/2010/main" val="750903798"/>
+        <p14:creationId xmlns:p14="http://schemas.microsoft.com/office/powerpoint/2010/main" val="3002369700"/>
       </p:ext>
     </p:extLst>
   </p:cSld>
@@ -6539,15 +6588,85 @@
           <a:p>
             <a:r>
               <a:rPr lang="en-US" dirty="0"/>
+              <a:t>- Use Case Diagrams</a:t>
+            </a:r>
+            <a:endParaRPr lang="th-TH" dirty="0"/>
+          </a:p>
+        </p:txBody>
+      </p:sp>
+      <p:sp>
+        <p:nvSpPr>
+          <p:cNvPr id="3" name="Content Placeholder 2"/>
+          <p:cNvSpPr>
+            <a:spLocks noGrp="1"/>
+          </p:cNvSpPr>
+          <p:nvPr>
+            <p:ph idx="1"/>
+          </p:nvPr>
+        </p:nvSpPr>
+        <p:spPr/>
+        <p:txBody>
+          <a:bodyPr/>
+          <a:lstStyle/>
+          <a:p>
+            <a:endParaRPr lang="th-TH"/>
+          </a:p>
+        </p:txBody>
+      </p:sp>
+    </p:spTree>
+    <p:extLst>
+      <p:ext uri="{BB962C8B-B14F-4D97-AF65-F5344CB8AC3E}">
+        <p14:creationId xmlns:p14="http://schemas.microsoft.com/office/powerpoint/2010/main" val="295132545"/>
+      </p:ext>
+    </p:extLst>
+  </p:cSld>
+  <p:clrMapOvr>
+    <a:masterClrMapping/>
+  </p:clrMapOvr>
+</p:sld>
+</file>
+
+<file path=ppt/slides/slide9.xml><?xml version="1.0" encoding="utf-8"?>
+<p:sld xmlns:a="http://schemas.openxmlformats.org/drawingml/2006/main" xmlns:r="http://schemas.openxmlformats.org/officeDocument/2006/relationships" xmlns:p="http://schemas.openxmlformats.org/presentationml/2006/main">
+  <p:cSld>
+    <p:spTree>
+      <p:nvGrpSpPr>
+        <p:cNvPr id="1" name=""/>
+        <p:cNvGrpSpPr/>
+        <p:nvPr/>
+      </p:nvGrpSpPr>
+      <p:grpSpPr>
+        <a:xfrm>
+          <a:off x="0" y="0"/>
+          <a:ext cx="0" cy="0"/>
+          <a:chOff x="0" y="0"/>
+          <a:chExt cx="0" cy="0"/>
+        </a:xfrm>
+      </p:grpSpPr>
+      <p:sp>
+        <p:nvSpPr>
+          <p:cNvPr id="2" name="Title 1"/>
+          <p:cNvSpPr>
+            <a:spLocks noGrp="1"/>
+          </p:cNvSpPr>
+          <p:nvPr>
+            <p:ph type="title"/>
+          </p:nvPr>
+        </p:nvSpPr>
+        <p:spPr/>
+        <p:txBody>
+          <a:bodyPr>
+            <a:normAutofit fontScale="90000"/>
+          </a:bodyPr>
+          <a:lstStyle/>
+          <a:p>
+            <a:r>
+              <a:rPr lang="en-US" dirty="0"/>
               <a:t>- Prototype </a:t>
             </a:r>
             <a:r>
               <a:rPr lang="th-TH" dirty="0"/>
               <a:t>ของระบบ (ครอบคลุมฟังก์ชันการทำงานทั้งหมด)</a:t>
-            </a:r>
-            <a:r>
-              <a:rPr lang="en-US" dirty="0"/>
-              <a:t/>
             </a:r>
             <a:br>
               <a:rPr lang="en-US" dirty="0"/>
@@ -6556,7 +6675,6 @@
               <a:rPr lang="th-TH" dirty="0"/>
               <a:t>นักศึกษาแต่ละกลุ่ม</a:t>
             </a:r>
-            <a:endParaRPr lang="th-TH" dirty="0"/>
           </a:p>
         </p:txBody>
       </p:sp>

</xml_diff>